<commit_message>
Update Presentation By Reena
</commit_message>
<xml_diff>
--- a/Reena/Presentation Final Draft.pptx
+++ b/Reena/Presentation Final Draft.pptx
@@ -5,7 +5,7 @@
     <p:sldMasterId id="2147483843" r:id="rId1"/>
   </p:sldMasterIdLst>
   <p:notesMasterIdLst>
-    <p:notesMasterId r:id="rId20"/>
+    <p:notesMasterId r:id="rId21"/>
   </p:notesMasterIdLst>
   <p:sldIdLst>
     <p:sldId id="256" r:id="rId2"/>
@@ -14,18 +14,19 @@
     <p:sldId id="260" r:id="rId5"/>
     <p:sldId id="262" r:id="rId6"/>
     <p:sldId id="264" r:id="rId7"/>
-    <p:sldId id="263" r:id="rId8"/>
-    <p:sldId id="265" r:id="rId9"/>
-    <p:sldId id="266" r:id="rId10"/>
-    <p:sldId id="268" r:id="rId11"/>
-    <p:sldId id="269" r:id="rId12"/>
-    <p:sldId id="270" r:id="rId13"/>
-    <p:sldId id="271" r:id="rId14"/>
-    <p:sldId id="273" r:id="rId15"/>
-    <p:sldId id="272" r:id="rId16"/>
-    <p:sldId id="267" r:id="rId17"/>
-    <p:sldId id="274" r:id="rId18"/>
-    <p:sldId id="275" r:id="rId19"/>
+    <p:sldId id="265" r:id="rId8"/>
+    <p:sldId id="276" r:id="rId9"/>
+    <p:sldId id="277" r:id="rId10"/>
+    <p:sldId id="266" r:id="rId11"/>
+    <p:sldId id="268" r:id="rId12"/>
+    <p:sldId id="269" r:id="rId13"/>
+    <p:sldId id="270" r:id="rId14"/>
+    <p:sldId id="271" r:id="rId15"/>
+    <p:sldId id="273" r:id="rId16"/>
+    <p:sldId id="272" r:id="rId17"/>
+    <p:sldId id="267" r:id="rId18"/>
+    <p:sldId id="274" r:id="rId19"/>
+    <p:sldId id="275" r:id="rId20"/>
   </p:sldIdLst>
   <p:sldSz cx="12192000" cy="6858000"/>
   <p:notesSz cx="6858000" cy="9144000"/>
@@ -124,6 +125,11 @@
       </a:defRPr>
     </a:lvl9pPr>
   </p:defaultTextStyle>
+  <p:extLst>
+    <p:ext uri="{EFAFB233-063F-42B5-8137-9DF3F51BA10A}">
+      <p15:sldGuideLst xmlns:p15="http://schemas.microsoft.com/office/powerpoint/2012/main"/>
+    </p:ext>
+  </p:extLst>
 </p:presentation>
 </file>
 
@@ -209,7 +215,7 @@
           <a:p>
             <a:fld id="{F69D43FF-2B5D-4E7E-A47B-B4A9DEA929CF}" type="datetimeFigureOut">
               <a:rPr lang="en-US" smtClean="0"/>
-              <a:t>6/15/2019</a:t>
+              <a:t>6/17/2019</a:t>
             </a:fld>
             <a:endParaRPr lang="en-US"/>
           </a:p>
@@ -677,7 +683,7 @@
           <a:p>
             <a:fld id="{6F0D264C-BC98-4275-BE42-DE110512DA9A}" type="slidenum">
               <a:rPr lang="en-US" smtClean="0"/>
-              <a:t>15</a:t>
+              <a:t>16</a:t>
             </a:fld>
             <a:endParaRPr lang="en-US"/>
           </a:p>
@@ -791,7 +797,7 @@
           <a:p>
             <a:fld id="{6F0D264C-BC98-4275-BE42-DE110512DA9A}" type="slidenum">
               <a:rPr lang="en-US" smtClean="0"/>
-              <a:t>16</a:t>
+              <a:t>17</a:t>
             </a:fld>
             <a:endParaRPr lang="en-US"/>
           </a:p>
@@ -898,7 +904,7 @@
           <a:p>
             <a:fld id="{6F0D264C-BC98-4275-BE42-DE110512DA9A}" type="slidenum">
               <a:rPr lang="en-US" smtClean="0"/>
-              <a:t>17</a:t>
+              <a:t>18</a:t>
             </a:fld>
             <a:endParaRPr lang="en-US"/>
           </a:p>
@@ -1228,7 +1234,7 @@
           <a:p>
             <a:fld id="{6F0D264C-BC98-4275-BE42-DE110512DA9A}" type="slidenum">
               <a:rPr lang="en-US" smtClean="0"/>
-              <a:t>9</a:t>
+              <a:t>10</a:t>
             </a:fld>
             <a:endParaRPr lang="en-US"/>
           </a:p>
@@ -1343,7 +1349,7 @@
           <a:p>
             <a:fld id="{6F0D264C-BC98-4275-BE42-DE110512DA9A}" type="slidenum">
               <a:rPr lang="en-US" smtClean="0"/>
-              <a:t>10</a:t>
+              <a:t>11</a:t>
             </a:fld>
             <a:endParaRPr lang="en-US"/>
           </a:p>
@@ -1458,7 +1464,7 @@
           <a:p>
             <a:fld id="{6F0D264C-BC98-4275-BE42-DE110512DA9A}" type="slidenum">
               <a:rPr lang="en-US" smtClean="0"/>
-              <a:t>11</a:t>
+              <a:t>12</a:t>
             </a:fld>
             <a:endParaRPr lang="en-US"/>
           </a:p>
@@ -1573,7 +1579,7 @@
           <a:p>
             <a:fld id="{6F0D264C-BC98-4275-BE42-DE110512DA9A}" type="slidenum">
               <a:rPr lang="en-US" smtClean="0"/>
-              <a:t>12</a:t>
+              <a:t>13</a:t>
             </a:fld>
             <a:endParaRPr lang="en-US"/>
           </a:p>
@@ -1688,7 +1694,7 @@
           <a:p>
             <a:fld id="{6F0D264C-BC98-4275-BE42-DE110512DA9A}" type="slidenum">
               <a:rPr lang="en-US" smtClean="0"/>
-              <a:t>13</a:t>
+              <a:t>14</a:t>
             </a:fld>
             <a:endParaRPr lang="en-US"/>
           </a:p>
@@ -1803,7 +1809,7 @@
           <a:p>
             <a:fld id="{6F0D264C-BC98-4275-BE42-DE110512DA9A}" type="slidenum">
               <a:rPr lang="en-US" smtClean="0"/>
-              <a:t>14</a:t>
+              <a:t>15</a:t>
             </a:fld>
             <a:endParaRPr lang="en-US"/>
           </a:p>
@@ -2012,7 +2018,7 @@
           <a:p>
             <a:fld id="{F962B18B-0D39-4BA3-B1C7-4BABD2CF7C67}" type="datetimeFigureOut">
               <a:rPr lang="en-US" smtClean="0"/>
-              <a:t>6/15/2019</a:t>
+              <a:t>6/17/2019</a:t>
             </a:fld>
             <a:endParaRPr lang="en-US"/>
           </a:p>
@@ -2217,7 +2223,7 @@
           <a:p>
             <a:fld id="{F962B18B-0D39-4BA3-B1C7-4BABD2CF7C67}" type="datetimeFigureOut">
               <a:rPr lang="en-US" smtClean="0"/>
-              <a:t>6/15/2019</a:t>
+              <a:t>6/17/2019</a:t>
             </a:fld>
             <a:endParaRPr lang="en-US"/>
           </a:p>
@@ -2397,7 +2403,7 @@
           <a:p>
             <a:fld id="{F962B18B-0D39-4BA3-B1C7-4BABD2CF7C67}" type="datetimeFigureOut">
               <a:rPr lang="en-US" smtClean="0"/>
-              <a:t>6/15/2019</a:t>
+              <a:t>6/17/2019</a:t>
             </a:fld>
             <a:endParaRPr lang="en-US"/>
           </a:p>
@@ -2602,7 +2608,7 @@
           <a:p>
             <a:fld id="{F962B18B-0D39-4BA3-B1C7-4BABD2CF7C67}" type="datetimeFigureOut">
               <a:rPr lang="en-US" smtClean="0"/>
-              <a:t>6/15/2019</a:t>
+              <a:t>6/17/2019</a:t>
             </a:fld>
             <a:endParaRPr lang="en-US"/>
           </a:p>
@@ -2897,7 +2903,7 @@
           <a:p>
             <a:fld id="{F962B18B-0D39-4BA3-B1C7-4BABD2CF7C67}" type="datetimeFigureOut">
               <a:rPr lang="en-US" smtClean="0"/>
-              <a:t>6/15/2019</a:t>
+              <a:t>6/17/2019</a:t>
             </a:fld>
             <a:endParaRPr lang="en-US"/>
           </a:p>
@@ -3169,7 +3175,7 @@
           <a:p>
             <a:fld id="{F962B18B-0D39-4BA3-B1C7-4BABD2CF7C67}" type="datetimeFigureOut">
               <a:rPr lang="en-US" smtClean="0"/>
-              <a:t>6/15/2019</a:t>
+              <a:t>6/17/2019</a:t>
             </a:fld>
             <a:endParaRPr lang="en-US"/>
           </a:p>
@@ -3576,7 +3582,7 @@
           <a:p>
             <a:fld id="{F962B18B-0D39-4BA3-B1C7-4BABD2CF7C67}" type="datetimeFigureOut">
               <a:rPr lang="en-US" smtClean="0"/>
-              <a:t>6/15/2019</a:t>
+              <a:t>6/17/2019</a:t>
             </a:fld>
             <a:endParaRPr lang="en-US"/>
           </a:p>
@@ -3694,7 +3700,7 @@
           <a:p>
             <a:fld id="{F962B18B-0D39-4BA3-B1C7-4BABD2CF7C67}" type="datetimeFigureOut">
               <a:rPr lang="en-US" smtClean="0"/>
-              <a:t>6/15/2019</a:t>
+              <a:t>6/17/2019</a:t>
             </a:fld>
             <a:endParaRPr lang="en-US"/>
           </a:p>
@@ -3789,7 +3795,7 @@
           <a:p>
             <a:fld id="{F962B18B-0D39-4BA3-B1C7-4BABD2CF7C67}" type="datetimeFigureOut">
               <a:rPr lang="en-US" smtClean="0"/>
-              <a:t>6/15/2019</a:t>
+              <a:t>6/17/2019</a:t>
             </a:fld>
             <a:endParaRPr lang="en-US"/>
           </a:p>
@@ -4079,7 +4085,7 @@
           <a:p>
             <a:fld id="{F962B18B-0D39-4BA3-B1C7-4BABD2CF7C67}" type="datetimeFigureOut">
               <a:rPr lang="en-US" smtClean="0"/>
-              <a:t>6/15/2019</a:t>
+              <a:t>6/17/2019</a:t>
             </a:fld>
             <a:endParaRPr lang="en-US"/>
           </a:p>
@@ -4359,7 +4365,7 @@
           <a:p>
             <a:fld id="{F962B18B-0D39-4BA3-B1C7-4BABD2CF7C67}" type="datetimeFigureOut">
               <a:rPr lang="en-US" smtClean="0"/>
-              <a:t>6/15/2019</a:t>
+              <a:t>6/17/2019</a:t>
             </a:fld>
             <a:endParaRPr lang="en-US"/>
           </a:p>
@@ -4609,7 +4615,7 @@
           <a:p>
             <a:fld id="{F962B18B-0D39-4BA3-B1C7-4BABD2CF7C67}" type="datetimeFigureOut">
               <a:rPr lang="en-US" smtClean="0"/>
-              <a:t>6/15/2019</a:t>
+              <a:t>6/17/2019</a:t>
             </a:fld>
             <a:endParaRPr lang="en-US"/>
           </a:p>
@@ -5268,7 +5274,7 @@
           <a:p>
             <a:r>
               <a:rPr lang="en-US" sz="3200" dirty="0" smtClean="0"/>
-              <a:t>Data Retrieval: Google API to add area zip codes in crime data</a:t>
+              <a:t>Data Cleanup and exploration  </a:t>
             </a:r>
             <a:endParaRPr lang="en-US" sz="3200" dirty="0"/>
           </a:p>
@@ -5291,10 +5297,77 @@
           </a:xfrm>
         </p:spPr>
         <p:txBody>
-          <a:bodyPr/>
-          <a:lstStyle/>
-          <a:p>
-            <a:endParaRPr lang="en-US" dirty="0"/>
+          <a:bodyPr>
+            <a:normAutofit/>
+          </a:bodyPr>
+          <a:lstStyle/>
+          <a:p>
+            <a:pPr marL="0" indent="0">
+              <a:buNone/>
+            </a:pPr>
+            <a:r>
+              <a:rPr lang="en-US" sz="2600" dirty="0" smtClean="0"/>
+              <a:t>Cleaning up with pandas:</a:t>
+            </a:r>
+          </a:p>
+          <a:p>
+            <a:pPr marL="742950" lvl="0" indent="-742950">
+              <a:buFont typeface="+mj-lt"/>
+              <a:buAutoNum type="arabicPeriod"/>
+            </a:pPr>
+            <a:r>
+              <a:rPr lang="en-US" sz="2600" dirty="0" smtClean="0"/>
+              <a:t>Create </a:t>
+            </a:r>
+            <a:r>
+              <a:rPr lang="en-US" sz="2600" dirty="0"/>
+              <a:t>consolidated report of 2016-2019 </a:t>
+            </a:r>
+            <a:r>
+              <a:rPr lang="en-US" sz="2600" dirty="0" smtClean="0"/>
+              <a:t>Crime and Foreclosure </a:t>
+            </a:r>
+            <a:endParaRPr lang="en-US" sz="2600" dirty="0"/>
+          </a:p>
+          <a:p>
+            <a:pPr marL="742950" lvl="0" indent="-742950">
+              <a:buFont typeface="+mj-lt"/>
+              <a:buAutoNum type="arabicPeriod"/>
+            </a:pPr>
+            <a:r>
+              <a:rPr lang="en-US" sz="2600" dirty="0" smtClean="0"/>
+              <a:t>Extract 2016-2019 Unemployment data for Los Angeles city</a:t>
+            </a:r>
+            <a:endParaRPr lang="en-US" sz="2600" dirty="0"/>
+          </a:p>
+          <a:p>
+            <a:pPr marL="742950" lvl="0" indent="-742950">
+              <a:buFont typeface="+mj-lt"/>
+              <a:buAutoNum type="arabicPeriod"/>
+            </a:pPr>
+            <a:r>
+              <a:rPr lang="en-US" sz="2600" dirty="0" smtClean="0"/>
+              <a:t>Add </a:t>
+            </a:r>
+            <a:r>
+              <a:rPr lang="en-US" sz="2600" dirty="0"/>
+              <a:t>Zip code column using latitude and longitude information in crime data (Used google API)</a:t>
+            </a:r>
+          </a:p>
+          <a:p>
+            <a:pPr marL="742950" lvl="0" indent="-742950">
+              <a:buFont typeface="+mj-lt"/>
+              <a:buAutoNum type="arabicPeriod"/>
+            </a:pPr>
+            <a:r>
+              <a:rPr lang="en-US" sz="2600" dirty="0"/>
+              <a:t>Merge Crime data and Foreclosure data using Zip code </a:t>
+            </a:r>
+            <a:r>
+              <a:rPr lang="en-US" sz="2600" dirty="0" smtClean="0"/>
+              <a:t>column and removed unnecessary columns.</a:t>
+            </a:r>
+            <a:endParaRPr lang="en-US" sz="2600" dirty="0"/>
           </a:p>
           <a:p>
             <a:pPr algn="ctr"/>
@@ -5305,45 +5378,15 @@
             <a:endParaRPr lang="en-US" sz="3600" dirty="0"/>
           </a:p>
           <a:p>
-            <a:pPr marL="0" indent="0" algn="ctr">
-              <a:buNone/>
-            </a:pPr>
-            <a:endParaRPr lang="en-US" sz="3600" dirty="0" smtClean="0"/>
-          </a:p>
-          <a:p>
             <a:pPr algn="ctr"/>
             <a:endParaRPr lang="en-US" sz="3600" dirty="0"/>
           </a:p>
         </p:txBody>
       </p:sp>
-      <p:pic>
-        <p:nvPicPr>
-          <p:cNvPr id="5" name="Picture 4"/>
-          <p:cNvPicPr>
-            <a:picLocks noChangeAspect="1"/>
-          </p:cNvPicPr>
-          <p:nvPr/>
-        </p:nvPicPr>
-        <p:blipFill>
-          <a:blip r:embed="rId3"/>
-          <a:stretch>
-            <a:fillRect/>
-          </a:stretch>
-        </p:blipFill>
-        <p:spPr>
-          <a:xfrm>
-            <a:off x="2258291" y="1619794"/>
-            <a:ext cx="7071637" cy="4227467"/>
-          </a:xfrm>
-          <a:prstGeom prst="rect">
-            <a:avLst/>
-          </a:prstGeom>
-        </p:spPr>
-      </p:pic>
     </p:spTree>
     <p:extLst>
       <p:ext uri="{BB962C8B-B14F-4D97-AF65-F5344CB8AC3E}">
-        <p14:creationId xmlns:p14="http://schemas.microsoft.com/office/powerpoint/2010/main" val="412352119"/>
+        <p14:creationId xmlns:p14="http://schemas.microsoft.com/office/powerpoint/2010/main" val="1725510494"/>
       </p:ext>
     </p:extLst>
   </p:cSld>
@@ -5444,28 +5487,22 @@
       </p:sp>
       <p:pic>
         <p:nvPicPr>
-          <p:cNvPr id="4" name="Picture 3"/>
+          <p:cNvPr id="5" name="Picture 4"/>
           <p:cNvPicPr>
             <a:picLocks noChangeAspect="1"/>
           </p:cNvPicPr>
           <p:nvPr/>
         </p:nvPicPr>
         <p:blipFill>
-          <a:blip r:embed="rId3" cstate="print">
-            <a:extLst>
-              <a:ext uri="{28A0092B-C50C-407E-A947-70E740481C1C}">
-                <a14:useLocalDpi xmlns:a14="http://schemas.microsoft.com/office/drawing/2010/main" val="0"/>
-              </a:ext>
-            </a:extLst>
-          </a:blip>
+          <a:blip r:embed="rId3"/>
           <a:stretch>
             <a:fillRect/>
           </a:stretch>
         </p:blipFill>
         <p:spPr>
           <a:xfrm>
-            <a:off x="1717964" y="1619794"/>
-            <a:ext cx="7906223" cy="4410521"/>
+            <a:off x="2258291" y="1619794"/>
+            <a:ext cx="7071637" cy="4227467"/>
           </a:xfrm>
           <a:prstGeom prst="rect">
             <a:avLst/>
@@ -5475,7 +5512,7 @@
     </p:spTree>
     <p:extLst>
       <p:ext uri="{BB962C8B-B14F-4D97-AF65-F5344CB8AC3E}">
-        <p14:creationId xmlns:p14="http://schemas.microsoft.com/office/powerpoint/2010/main" val="3428742672"/>
+        <p14:creationId xmlns:p14="http://schemas.microsoft.com/office/powerpoint/2010/main" val="412352119"/>
       </p:ext>
     </p:extLst>
   </p:cSld>
@@ -5526,7 +5563,7 @@
           <a:p>
             <a:r>
               <a:rPr lang="en-US" sz="3200" dirty="0" smtClean="0"/>
-              <a:t>Data Retrieval: Merged Crime and Foreclosure Data</a:t>
+              <a:t>Data Retrieval: Google API to add area zip codes in crime data</a:t>
             </a:r>
             <a:endParaRPr lang="en-US" sz="3200" dirty="0"/>
           </a:p>
@@ -5596,8 +5633,8 @@
         </p:blipFill>
         <p:spPr>
           <a:xfrm>
-            <a:off x="1717963" y="1591825"/>
-            <a:ext cx="7818250" cy="4717535"/>
+            <a:off x="1717964" y="1619794"/>
+            <a:ext cx="7906223" cy="4410521"/>
           </a:xfrm>
           <a:prstGeom prst="rect">
             <a:avLst/>
@@ -5607,7 +5644,7 @@
     </p:spTree>
     <p:extLst>
       <p:ext uri="{BB962C8B-B14F-4D97-AF65-F5344CB8AC3E}">
-        <p14:creationId xmlns:p14="http://schemas.microsoft.com/office/powerpoint/2010/main" val="1659337091"/>
+        <p14:creationId xmlns:p14="http://schemas.microsoft.com/office/powerpoint/2010/main" val="3428742672"/>
       </p:ext>
     </p:extLst>
   </p:cSld>
@@ -5657,12 +5694,8 @@
           <a:lstStyle/>
           <a:p>
             <a:r>
-              <a:rPr lang="en-US" sz="3200" dirty="0"/>
-              <a:t>Analyze for Trends (Table)</a:t>
-            </a:r>
-            <a:r>
               <a:rPr lang="en-US" sz="3200" dirty="0" smtClean="0"/>
-              <a:t> </a:t>
+              <a:t>Data Retrieval: Merged Crime and Foreclosure Data</a:t>
             </a:r>
             <a:endParaRPr lang="en-US" sz="3200" dirty="0"/>
           </a:p>
@@ -5712,22 +5745,28 @@
       </p:sp>
       <p:pic>
         <p:nvPicPr>
-          <p:cNvPr id="5" name="Picture 4"/>
+          <p:cNvPr id="4" name="Picture 3"/>
           <p:cNvPicPr>
             <a:picLocks noChangeAspect="1"/>
           </p:cNvPicPr>
           <p:nvPr/>
         </p:nvPicPr>
         <p:blipFill>
-          <a:blip r:embed="rId3"/>
+          <a:blip r:embed="rId3" cstate="print">
+            <a:extLst>
+              <a:ext uri="{28A0092B-C50C-407E-A947-70E740481C1C}">
+                <a14:useLocalDpi xmlns:a14="http://schemas.microsoft.com/office/drawing/2010/main" val="0"/>
+              </a:ext>
+            </a:extLst>
+          </a:blip>
           <a:stretch>
             <a:fillRect/>
           </a:stretch>
         </p:blipFill>
         <p:spPr>
           <a:xfrm>
-            <a:off x="1440873" y="1619794"/>
-            <a:ext cx="8482012" cy="4542077"/>
+            <a:off x="1717963" y="1591825"/>
+            <a:ext cx="7818250" cy="4717535"/>
           </a:xfrm>
           <a:prstGeom prst="rect">
             <a:avLst/>
@@ -5737,7 +5776,7 @@
     </p:spTree>
     <p:extLst>
       <p:ext uri="{BB962C8B-B14F-4D97-AF65-F5344CB8AC3E}">
-        <p14:creationId xmlns:p14="http://schemas.microsoft.com/office/powerpoint/2010/main" val="3655811843"/>
+        <p14:creationId xmlns:p14="http://schemas.microsoft.com/office/powerpoint/2010/main" val="1659337091"/>
       </p:ext>
     </p:extLst>
   </p:cSld>
@@ -5782,13 +5821,17 @@
         </p:spPr>
         <p:txBody>
           <a:bodyPr>
-            <a:noAutofit/>
+            <a:normAutofit/>
           </a:bodyPr>
           <a:lstStyle/>
           <a:p>
             <a:r>
+              <a:rPr lang="en-US" sz="3200" dirty="0"/>
+              <a:t>Analyze for Trends (Table)</a:t>
+            </a:r>
+            <a:r>
               <a:rPr lang="en-US" sz="3200" dirty="0" smtClean="0"/>
-              <a:t>Conclusion</a:t>
+              <a:t> </a:t>
             </a:r>
             <a:endParaRPr lang="en-US" sz="3200" dirty="0"/>
           </a:p>
@@ -5811,15 +5854,14 @@
           </a:xfrm>
         </p:spPr>
         <p:txBody>
-          <a:bodyPr>
-            <a:normAutofit/>
-          </a:bodyPr>
-          <a:lstStyle/>
-          <a:p>
-            <a:pPr marL="0" indent="0">
-              <a:buNone/>
-            </a:pPr>
-            <a:endParaRPr lang="en-US" sz="3300" dirty="0" smtClean="0"/>
+          <a:bodyPr/>
+          <a:lstStyle/>
+          <a:p>
+            <a:endParaRPr lang="en-US" dirty="0"/>
+          </a:p>
+          <a:p>
+            <a:pPr algn="ctr"/>
+            <a:endParaRPr lang="en-US" sz="3600" dirty="0" smtClean="0"/>
           </a:p>
           <a:p>
             <a:pPr algn="ctr"/>
@@ -5839,7 +5881,7 @@
       </p:sp>
       <p:pic>
         <p:nvPicPr>
-          <p:cNvPr id="4" name="Picture 3"/>
+          <p:cNvPr id="5" name="Picture 4"/>
           <p:cNvPicPr>
             <a:picLocks noChangeAspect="1"/>
           </p:cNvPicPr>
@@ -5853,56 +5895,8 @@
         </p:blipFill>
         <p:spPr>
           <a:xfrm>
-            <a:off x="1024128" y="1789611"/>
-            <a:ext cx="3756070" cy="2782389"/>
-          </a:xfrm>
-          <a:prstGeom prst="rect">
-            <a:avLst/>
-          </a:prstGeom>
-        </p:spPr>
-      </p:pic>
-      <p:pic>
-        <p:nvPicPr>
-          <p:cNvPr id="5" name="Picture 4"/>
-          <p:cNvPicPr>
-            <a:picLocks noChangeAspect="1"/>
-          </p:cNvPicPr>
-          <p:nvPr/>
-        </p:nvPicPr>
-        <p:blipFill>
-          <a:blip r:embed="rId4"/>
-          <a:stretch>
-            <a:fillRect/>
-          </a:stretch>
-        </p:blipFill>
-        <p:spPr>
-          <a:xfrm>
-            <a:off x="4585856" y="1789611"/>
-            <a:ext cx="4014474" cy="2657475"/>
-          </a:xfrm>
-          <a:prstGeom prst="rect">
-            <a:avLst/>
-          </a:prstGeom>
-        </p:spPr>
-      </p:pic>
-      <p:pic>
-        <p:nvPicPr>
-          <p:cNvPr id="6" name="Picture 5"/>
-          <p:cNvPicPr>
-            <a:picLocks noChangeAspect="1"/>
-          </p:cNvPicPr>
-          <p:nvPr/>
-        </p:nvPicPr>
-        <p:blipFill>
-          <a:blip r:embed="rId5"/>
-          <a:stretch>
-            <a:fillRect/>
-          </a:stretch>
-        </p:blipFill>
-        <p:spPr>
-          <a:xfrm>
-            <a:off x="8600329" y="1818186"/>
-            <a:ext cx="3439271" cy="2628900"/>
+            <a:off x="1440873" y="1619794"/>
+            <a:ext cx="8482012" cy="4542077"/>
           </a:xfrm>
           <a:prstGeom prst="rect">
             <a:avLst/>
@@ -5912,7 +5906,7 @@
     </p:spTree>
     <p:extLst>
       <p:ext uri="{BB962C8B-B14F-4D97-AF65-F5344CB8AC3E}">
-        <p14:creationId xmlns:p14="http://schemas.microsoft.com/office/powerpoint/2010/main" val="2516559150"/>
+        <p14:creationId xmlns:p14="http://schemas.microsoft.com/office/powerpoint/2010/main" val="3655811843"/>
       </p:ext>
     </p:extLst>
   </p:cSld>
@@ -5994,72 +5988,7 @@
             <a:pPr marL="0" indent="0">
               <a:buNone/>
             </a:pPr>
-            <a:r>
-              <a:rPr lang="en-US" sz="2800" dirty="0" smtClean="0"/>
-              <a:t>We collected Los Angeles city data </a:t>
-            </a:r>
-            <a:r>
-              <a:rPr lang="en-US" sz="2800" dirty="0"/>
-              <a:t>to estimate a system that </a:t>
-            </a:r>
-            <a:r>
-              <a:rPr lang="en-US" sz="2800" dirty="0" smtClean="0"/>
-              <a:t>includes crime, unemployment rate and foreclosures information. </a:t>
-            </a:r>
-            <a:r>
-              <a:rPr lang="en-US" sz="2800" dirty="0"/>
-              <a:t>Based on our analysis, it is clear </a:t>
-            </a:r>
-            <a:r>
-              <a:rPr lang="en-US" sz="2800" dirty="0" smtClean="0"/>
-              <a:t>that decrease </a:t>
-            </a:r>
-            <a:r>
-              <a:rPr lang="en-US" sz="2800" dirty="0"/>
-              <a:t>in foreclosures have a </a:t>
-            </a:r>
-            <a:r>
-              <a:rPr lang="en-US" sz="2800" dirty="0" smtClean="0"/>
-              <a:t>causal </a:t>
-            </a:r>
-            <a:r>
-              <a:rPr lang="en-US" sz="2800" dirty="0"/>
-              <a:t>effect on </a:t>
-            </a:r>
-            <a:r>
-              <a:rPr lang="en-US" sz="2800" dirty="0" smtClean="0"/>
-              <a:t>unemployment </a:t>
-            </a:r>
-            <a:r>
-              <a:rPr lang="en-US" sz="2800" dirty="0"/>
-              <a:t>while lower </a:t>
-            </a:r>
-            <a:r>
-              <a:rPr lang="en-US" sz="2800" dirty="0" smtClean="0"/>
-              <a:t>foreclosures </a:t>
-            </a:r>
-            <a:r>
-              <a:rPr lang="en-US" sz="2800" dirty="0"/>
-              <a:t>have a </a:t>
-            </a:r>
-            <a:r>
-              <a:rPr lang="en-US" sz="2800" dirty="0" smtClean="0"/>
-              <a:t>considerable </a:t>
-            </a:r>
-            <a:r>
-              <a:rPr lang="en-US" sz="2800" dirty="0"/>
-              <a:t>effect on </a:t>
-            </a:r>
-            <a:r>
-              <a:rPr lang="en-US" sz="2800" dirty="0" smtClean="0"/>
-              <a:t>crime rate.</a:t>
-            </a:r>
-          </a:p>
-          <a:p>
-            <a:pPr marL="0" indent="0">
-              <a:buNone/>
-            </a:pPr>
-            <a:endParaRPr lang="en-US" sz="2800" dirty="0" smtClean="0"/>
+            <a:endParaRPr lang="en-US" sz="3300" dirty="0" smtClean="0"/>
           </a:p>
           <a:p>
             <a:pPr algn="ctr"/>
@@ -6093,8 +6022,56 @@
         </p:blipFill>
         <p:spPr>
           <a:xfrm>
-            <a:off x="2345128" y="4049485"/>
-            <a:ext cx="7078069" cy="1749704"/>
+            <a:off x="1024128" y="1789611"/>
+            <a:ext cx="3756070" cy="2782389"/>
+          </a:xfrm>
+          <a:prstGeom prst="rect">
+            <a:avLst/>
+          </a:prstGeom>
+        </p:spPr>
+      </p:pic>
+      <p:pic>
+        <p:nvPicPr>
+          <p:cNvPr id="5" name="Picture 4"/>
+          <p:cNvPicPr>
+            <a:picLocks noChangeAspect="1"/>
+          </p:cNvPicPr>
+          <p:nvPr/>
+        </p:nvPicPr>
+        <p:blipFill>
+          <a:blip r:embed="rId4"/>
+          <a:stretch>
+            <a:fillRect/>
+          </a:stretch>
+        </p:blipFill>
+        <p:spPr>
+          <a:xfrm>
+            <a:off x="4585856" y="1789611"/>
+            <a:ext cx="4014474" cy="2657475"/>
+          </a:xfrm>
+          <a:prstGeom prst="rect">
+            <a:avLst/>
+          </a:prstGeom>
+        </p:spPr>
+      </p:pic>
+      <p:pic>
+        <p:nvPicPr>
+          <p:cNvPr id="6" name="Picture 5"/>
+          <p:cNvPicPr>
+            <a:picLocks noChangeAspect="1"/>
+          </p:cNvPicPr>
+          <p:nvPr/>
+        </p:nvPicPr>
+        <p:blipFill>
+          <a:blip r:embed="rId5"/>
+          <a:stretch>
+            <a:fillRect/>
+          </a:stretch>
+        </p:blipFill>
+        <p:spPr>
+          <a:xfrm>
+            <a:off x="8600329" y="1818186"/>
+            <a:ext cx="3439271" cy="2628900"/>
           </a:xfrm>
           <a:prstGeom prst="rect">
             <a:avLst/>
@@ -6104,7 +6081,7 @@
     </p:spTree>
     <p:extLst>
       <p:ext uri="{BB962C8B-B14F-4D97-AF65-F5344CB8AC3E}">
-        <p14:creationId xmlns:p14="http://schemas.microsoft.com/office/powerpoint/2010/main" val="3701768842"/>
+        <p14:creationId xmlns:p14="http://schemas.microsoft.com/office/powerpoint/2010/main" val="2516559150"/>
       </p:ext>
     </p:extLst>
   </p:cSld>
@@ -6149,13 +6126,13 @@
         </p:spPr>
         <p:txBody>
           <a:bodyPr>
-            <a:normAutofit/>
+            <a:noAutofit/>
           </a:bodyPr>
           <a:lstStyle/>
           <a:p>
             <a:r>
               <a:rPr lang="en-US" sz="3200" dirty="0" smtClean="0"/>
-              <a:t>if we had two more weeks, we would have researched….</a:t>
+              <a:t>Conclusion</a:t>
             </a:r>
             <a:endParaRPr lang="en-US" sz="3200" dirty="0"/>
           </a:p>
@@ -6178,18 +6155,47 @@
           </a:xfrm>
         </p:spPr>
         <p:txBody>
-          <a:bodyPr/>
-          <a:lstStyle/>
-          <a:p>
+          <a:bodyPr>
+            <a:normAutofit/>
+          </a:bodyPr>
+          <a:lstStyle/>
+          <a:p>
+            <a:pPr lvl="0"/>
+            <a:r>
+              <a:rPr lang="en-US" dirty="0"/>
+              <a:t>Based on our analysis, we do observe a small but significant positive “net” effect of foreclosure rates in </a:t>
+            </a:r>
+            <a:r>
+              <a:rPr lang="en-US" dirty="0" smtClean="0"/>
+              <a:t>2017-2018. </a:t>
+            </a:r>
+            <a:r>
+              <a:rPr lang="en-US" dirty="0"/>
+              <a:t>In particular, by analyzing each </a:t>
+            </a:r>
+            <a:r>
+              <a:rPr lang="en-US" dirty="0" smtClean="0"/>
+              <a:t>year </a:t>
+            </a:r>
+            <a:r>
+              <a:rPr lang="en-US" dirty="0"/>
+              <a:t>separately, we show that neighborhood foreclosure is significantly associated with crime in a small number of selected areas; in the majority of the areas considered, foreclosure did not exert a significant main effect on either crime type. However, it is clear that decrease in foreclosures have a causal effect on </a:t>
+            </a:r>
+            <a:r>
+              <a:rPr lang="en-US" dirty="0" smtClean="0"/>
+              <a:t>unemployment.</a:t>
+            </a:r>
             <a:endParaRPr lang="en-US" dirty="0"/>
-          </a:p>
-          <a:p>
-            <a:pPr algn="ctr"/>
-            <a:endParaRPr lang="en-US" sz="3600" dirty="0" smtClean="0"/>
           </a:p>
           <a:p>
             <a:pPr algn="ctr"/>
             <a:endParaRPr lang="en-US" sz="3600" dirty="0"/>
+          </a:p>
+          <a:p>
+            <a:pPr marL="0" indent="0" algn="ctr">
+              <a:buNone/>
+            </a:pPr>
+            <a:endParaRPr lang="en-US" sz="3600" dirty="0" smtClean="0"/>
           </a:p>
           <a:p>
             <a:pPr algn="ctr"/>
@@ -6213,8 +6219,8 @@
         </p:blipFill>
         <p:spPr>
           <a:xfrm>
-            <a:off x="1538287" y="1562100"/>
-            <a:ext cx="9115425" cy="4533900"/>
+            <a:off x="2345128" y="4049485"/>
+            <a:ext cx="7078069" cy="1749704"/>
           </a:xfrm>
           <a:prstGeom prst="rect">
             <a:avLst/>
@@ -6224,7 +6230,7 @@
     </p:spTree>
     <p:extLst>
       <p:ext uri="{BB962C8B-B14F-4D97-AF65-F5344CB8AC3E}">
-        <p14:creationId xmlns:p14="http://schemas.microsoft.com/office/powerpoint/2010/main" val="3013608478"/>
+        <p14:creationId xmlns:p14="http://schemas.microsoft.com/office/powerpoint/2010/main" val="3701768842"/>
       </p:ext>
     </p:extLst>
   </p:cSld>
@@ -6263,6 +6269,126 @@
         </p:nvSpPr>
         <p:spPr>
           <a:xfrm>
+            <a:off x="1024128" y="965871"/>
+            <a:ext cx="10058400" cy="653923"/>
+          </a:xfrm>
+        </p:spPr>
+        <p:txBody>
+          <a:bodyPr>
+            <a:normAutofit/>
+          </a:bodyPr>
+          <a:lstStyle/>
+          <a:p>
+            <a:r>
+              <a:rPr lang="en-US" sz="3200" dirty="0" smtClean="0"/>
+              <a:t>if we had two more weeks, we would have researched….</a:t>
+            </a:r>
+            <a:endParaRPr lang="en-US" sz="3200" dirty="0"/>
+          </a:p>
+        </p:txBody>
+      </p:sp>
+      <p:sp>
+        <p:nvSpPr>
+          <p:cNvPr id="3" name="Content Placeholder 2"/>
+          <p:cNvSpPr>
+            <a:spLocks noGrp="1"/>
+          </p:cNvSpPr>
+          <p:nvPr>
+            <p:ph idx="1"/>
+          </p:nvPr>
+        </p:nvSpPr>
+        <p:spPr>
+          <a:xfrm>
+            <a:off x="1024128" y="1789611"/>
+            <a:ext cx="9720071" cy="4519749"/>
+          </a:xfrm>
+        </p:spPr>
+        <p:txBody>
+          <a:bodyPr/>
+          <a:lstStyle/>
+          <a:p>
+            <a:endParaRPr lang="en-US" dirty="0"/>
+          </a:p>
+          <a:p>
+            <a:pPr algn="ctr"/>
+            <a:endParaRPr lang="en-US" sz="3600" dirty="0" smtClean="0"/>
+          </a:p>
+          <a:p>
+            <a:pPr algn="ctr"/>
+            <a:endParaRPr lang="en-US" sz="3600" dirty="0"/>
+          </a:p>
+          <a:p>
+            <a:pPr algn="ctr"/>
+            <a:endParaRPr lang="en-US" sz="3600" dirty="0"/>
+          </a:p>
+        </p:txBody>
+      </p:sp>
+      <p:pic>
+        <p:nvPicPr>
+          <p:cNvPr id="4" name="Picture 3"/>
+          <p:cNvPicPr>
+            <a:picLocks noChangeAspect="1"/>
+          </p:cNvPicPr>
+          <p:nvPr/>
+        </p:nvPicPr>
+        <p:blipFill>
+          <a:blip r:embed="rId3"/>
+          <a:stretch>
+            <a:fillRect/>
+          </a:stretch>
+        </p:blipFill>
+        <p:spPr>
+          <a:xfrm>
+            <a:off x="1538287" y="1562100"/>
+            <a:ext cx="9115425" cy="4533900"/>
+          </a:xfrm>
+          <a:prstGeom prst="rect">
+            <a:avLst/>
+          </a:prstGeom>
+        </p:spPr>
+      </p:pic>
+    </p:spTree>
+    <p:extLst>
+      <p:ext uri="{BB962C8B-B14F-4D97-AF65-F5344CB8AC3E}">
+        <p14:creationId xmlns:p14="http://schemas.microsoft.com/office/powerpoint/2010/main" val="3013608478"/>
+      </p:ext>
+    </p:extLst>
+  </p:cSld>
+  <p:clrMapOvr>
+    <a:masterClrMapping/>
+  </p:clrMapOvr>
+</p:sld>
+</file>
+
+<file path=ppt/slides/slide18.xml><?xml version="1.0" encoding="utf-8"?>
+<p:sld xmlns:a="http://schemas.openxmlformats.org/drawingml/2006/main" xmlns:r="http://schemas.openxmlformats.org/officeDocument/2006/relationships" xmlns:p="http://schemas.openxmlformats.org/presentationml/2006/main">
+  <p:cSld>
+    <p:spTree>
+      <p:nvGrpSpPr>
+        <p:cNvPr id="1" name=""/>
+        <p:cNvGrpSpPr/>
+        <p:nvPr/>
+      </p:nvGrpSpPr>
+      <p:grpSpPr>
+        <a:xfrm>
+          <a:off x="0" y="0"/>
+          <a:ext cx="0" cy="0"/>
+          <a:chOff x="0" y="0"/>
+          <a:chExt cx="0" cy="0"/>
+        </a:xfrm>
+      </p:grpSpPr>
+      <p:sp>
+        <p:nvSpPr>
+          <p:cNvPr id="2" name="Title 1"/>
+          <p:cNvSpPr>
+            <a:spLocks noGrp="1"/>
+          </p:cNvSpPr>
+          <p:nvPr>
+            <p:ph type="title"/>
+          </p:nvPr>
+        </p:nvSpPr>
+        <p:spPr>
+          <a:xfrm>
             <a:off x="1024128" y="886691"/>
             <a:ext cx="9720072" cy="1108363"/>
           </a:xfrm>
@@ -6340,7 +6466,6 @@
               <a:rPr lang="en-US" sz="2800" dirty="0"/>
               <a:t>We could have find out if impacts on crime vary depending on the outcomes of the foreclosures.</a:t>
             </a:r>
-            <a:endParaRPr lang="en-US" sz="2800" dirty="0"/>
           </a:p>
         </p:txBody>
       </p:sp>
@@ -6357,7 +6482,7 @@
 </p:sld>
 </file>
 
-<file path=ppt/slides/slide18.xml><?xml version="1.0" encoding="utf-8"?>
+<file path=ppt/slides/slide19.xml><?xml version="1.0" encoding="utf-8"?>
 <p:sld xmlns:a="http://schemas.openxmlformats.org/drawingml/2006/main" xmlns:r="http://schemas.openxmlformats.org/officeDocument/2006/relationships" xmlns:p="http://schemas.openxmlformats.org/presentationml/2006/main">
   <p:cSld>
     <p:spTree>
@@ -7289,12 +7414,21 @@
           <a:p>
             <a:r>
               <a:rPr lang="en-US" sz="3200" dirty="0" smtClean="0"/>
-              <a:t>Crime rate by highest Foreclosure Area </a:t>
-            </a:r>
-            <a:r>
-              <a:rPr lang="en-US" sz="3200" dirty="0"/>
-              <a:t>(Between 2016 – 2019)</a:t>
-            </a:r>
+              <a:t>Top Crimes in foreclosure zones </a:t>
+            </a:r>
+            <a:r>
+              <a:rPr lang="en-US" sz="3200" dirty="0" smtClean="0"/>
+              <a:t>(</a:t>
+            </a:r>
+            <a:r>
+              <a:rPr lang="en-US" sz="3200" dirty="0" smtClean="0"/>
+              <a:t>2016</a:t>
+            </a:r>
+            <a:r>
+              <a:rPr lang="en-US" sz="3200" dirty="0" smtClean="0"/>
+              <a:t>) </a:t>
+            </a:r>
+            <a:endParaRPr lang="en-US" sz="3200" dirty="0"/>
           </a:p>
         </p:txBody>
       </p:sp>
@@ -7356,8 +7490,8 @@
         </p:blipFill>
         <p:spPr>
           <a:xfrm>
-            <a:off x="0" y="1440873"/>
-            <a:ext cx="12192000" cy="4719848"/>
+            <a:off x="0" y="1620882"/>
+            <a:ext cx="12054564" cy="4857205"/>
           </a:xfrm>
           <a:prstGeom prst="rect">
             <a:avLst/>
@@ -7367,7 +7501,7 @@
     </p:spTree>
     <p:extLst>
       <p:ext uri="{BB962C8B-B14F-4D97-AF65-F5344CB8AC3E}">
-        <p14:creationId xmlns:p14="http://schemas.microsoft.com/office/powerpoint/2010/main" val="514858640"/>
+        <p14:creationId xmlns:p14="http://schemas.microsoft.com/office/powerpoint/2010/main" val="1772122558"/>
       </p:ext>
     </p:extLst>
   </p:cSld>
@@ -7421,12 +7555,16 @@
               <a:t>Top Crimes in foreclosure zones </a:t>
             </a:r>
             <a:r>
-              <a:rPr lang="en-US" sz="3200" dirty="0"/>
-              <a:t>(Between 2016 – 2019)</a:t>
-            </a:r>
-            <a:r>
               <a:rPr lang="en-US" sz="3200" dirty="0" smtClean="0"/>
-              <a:t> </a:t>
+              <a:t>(</a:t>
+            </a:r>
+            <a:r>
+              <a:rPr lang="en-US" sz="3200" dirty="0" smtClean="0"/>
+              <a:t>2017</a:t>
+            </a:r>
+            <a:r>
+              <a:rPr lang="en-US" sz="3200" dirty="0" smtClean="0"/>
+              <a:t>) </a:t>
             </a:r>
             <a:endParaRPr lang="en-US" sz="3200" dirty="0"/>
           </a:p>
@@ -7490,8 +7628,8 @@
         </p:blipFill>
         <p:spPr>
           <a:xfrm>
-            <a:off x="0" y="1399308"/>
-            <a:ext cx="12192000" cy="5077691"/>
+            <a:off x="0" y="1413164"/>
+            <a:ext cx="12192000" cy="5063836"/>
           </a:xfrm>
           <a:prstGeom prst="rect">
             <a:avLst/>
@@ -7501,7 +7639,7 @@
     </p:spTree>
     <p:extLst>
       <p:ext uri="{BB962C8B-B14F-4D97-AF65-F5344CB8AC3E}">
-        <p14:creationId xmlns:p14="http://schemas.microsoft.com/office/powerpoint/2010/main" val="1772122558"/>
+        <p14:creationId xmlns:p14="http://schemas.microsoft.com/office/powerpoint/2010/main" val="4266846173"/>
       </p:ext>
     </p:extLst>
   </p:cSld>
@@ -7552,7 +7690,19 @@
           <a:p>
             <a:r>
               <a:rPr lang="en-US" sz="3200" dirty="0" smtClean="0"/>
-              <a:t>Data Cleanup and exploration  </a:t>
+              <a:t>Top Crimes in foreclosure zones </a:t>
+            </a:r>
+            <a:r>
+              <a:rPr lang="en-US" sz="3200" dirty="0" smtClean="0"/>
+              <a:t>(</a:t>
+            </a:r>
+            <a:r>
+              <a:rPr lang="en-US" sz="3200" dirty="0" smtClean="0"/>
+              <a:t>2018</a:t>
+            </a:r>
+            <a:r>
+              <a:rPr lang="en-US" sz="3200" dirty="0" smtClean="0"/>
+              <a:t>) </a:t>
             </a:r>
             <a:endParaRPr lang="en-US" sz="3200" dirty="0"/>
           </a:p>
@@ -7575,77 +7725,10 @@
           </a:xfrm>
         </p:spPr>
         <p:txBody>
-          <a:bodyPr>
-            <a:normAutofit/>
-          </a:bodyPr>
-          <a:lstStyle/>
-          <a:p>
-            <a:pPr marL="0" indent="0">
-              <a:buNone/>
-            </a:pPr>
-            <a:r>
-              <a:rPr lang="en-US" sz="2600" dirty="0" smtClean="0"/>
-              <a:t>Cleaning up with pandas:</a:t>
-            </a:r>
-          </a:p>
-          <a:p>
-            <a:pPr marL="742950" lvl="0" indent="-742950">
-              <a:buFont typeface="+mj-lt"/>
-              <a:buAutoNum type="arabicPeriod"/>
-            </a:pPr>
-            <a:r>
-              <a:rPr lang="en-US" sz="2600" dirty="0" smtClean="0"/>
-              <a:t>Create </a:t>
-            </a:r>
-            <a:r>
-              <a:rPr lang="en-US" sz="2600" dirty="0"/>
-              <a:t>consolidated report of 2016-2019 </a:t>
-            </a:r>
-            <a:r>
-              <a:rPr lang="en-US" sz="2600" dirty="0" smtClean="0"/>
-              <a:t>Crime and Foreclosure </a:t>
-            </a:r>
-            <a:endParaRPr lang="en-US" sz="2600" dirty="0"/>
-          </a:p>
-          <a:p>
-            <a:pPr marL="742950" lvl="0" indent="-742950">
-              <a:buFont typeface="+mj-lt"/>
-              <a:buAutoNum type="arabicPeriod"/>
-            </a:pPr>
-            <a:r>
-              <a:rPr lang="en-US" sz="2600" dirty="0" smtClean="0"/>
-              <a:t>Extract 2016-2019 Unemployment data for Los Angeles city</a:t>
-            </a:r>
-            <a:endParaRPr lang="en-US" sz="2600" dirty="0"/>
-          </a:p>
-          <a:p>
-            <a:pPr marL="742950" lvl="0" indent="-742950">
-              <a:buFont typeface="+mj-lt"/>
-              <a:buAutoNum type="arabicPeriod"/>
-            </a:pPr>
-            <a:r>
-              <a:rPr lang="en-US" sz="2600" dirty="0" smtClean="0"/>
-              <a:t>Add </a:t>
-            </a:r>
-            <a:r>
-              <a:rPr lang="en-US" sz="2600" dirty="0"/>
-              <a:t>Zip code column using latitude and longitude information in crime data (Used google API)</a:t>
-            </a:r>
-          </a:p>
-          <a:p>
-            <a:pPr marL="742950" lvl="0" indent="-742950">
-              <a:buFont typeface="+mj-lt"/>
-              <a:buAutoNum type="arabicPeriod"/>
-            </a:pPr>
-            <a:r>
-              <a:rPr lang="en-US" sz="2600" dirty="0"/>
-              <a:t>Merge Crime data and Foreclosure data using Zip code </a:t>
-            </a:r>
-            <a:r>
-              <a:rPr lang="en-US" sz="2600" dirty="0" smtClean="0"/>
-              <a:t>column and removed unnecessary columns.</a:t>
-            </a:r>
-            <a:endParaRPr lang="en-US" sz="2600" dirty="0"/>
+          <a:bodyPr/>
+          <a:lstStyle/>
+          <a:p>
+            <a:endParaRPr lang="en-US" dirty="0"/>
           </a:p>
           <a:p>
             <a:pPr algn="ctr"/>
@@ -7661,10 +7744,40 @@
           </a:p>
         </p:txBody>
       </p:sp>
+      <p:pic>
+        <p:nvPicPr>
+          <p:cNvPr id="5" name="Picture 4"/>
+          <p:cNvPicPr>
+            <a:picLocks noChangeAspect="1"/>
+          </p:cNvPicPr>
+          <p:nvPr/>
+        </p:nvPicPr>
+        <p:blipFill>
+          <a:blip r:embed="rId2">
+            <a:extLst>
+              <a:ext uri="{28A0092B-C50C-407E-A947-70E740481C1C}">
+                <a14:useLocalDpi xmlns:a14="http://schemas.microsoft.com/office/drawing/2010/main" val="0"/>
+              </a:ext>
+            </a:extLst>
+          </a:blip>
+          <a:stretch>
+            <a:fillRect/>
+          </a:stretch>
+        </p:blipFill>
+        <p:spPr>
+          <a:xfrm>
+            <a:off x="0" y="1789610"/>
+            <a:ext cx="12192000" cy="4687389"/>
+          </a:xfrm>
+          <a:prstGeom prst="rect">
+            <a:avLst/>
+          </a:prstGeom>
+        </p:spPr>
+      </p:pic>
     </p:spTree>
     <p:extLst>
       <p:ext uri="{BB962C8B-B14F-4D97-AF65-F5344CB8AC3E}">
-        <p14:creationId xmlns:p14="http://schemas.microsoft.com/office/powerpoint/2010/main" val="1725510494"/>
+        <p14:creationId xmlns:p14="http://schemas.microsoft.com/office/powerpoint/2010/main" val="1683141984"/>
       </p:ext>
     </p:extLst>
   </p:cSld>

</xml_diff>